<commit_message>
Update Guided Capstone Project Slide Deck.pptx
</commit_message>
<xml_diff>
--- a/Guided Capstone Project Slide Deck.pptx
+++ b/Guided Capstone Project Slide Deck.pptx
@@ -2,36 +2,37 @@
 <file path=ppt/presentation.xml><?xml version="1.0" encoding="utf-8"?>
 <p:presentation xmlns:a="http://schemas.openxmlformats.org/drawingml/2006/main" xmlns:r="http://schemas.openxmlformats.org/officeDocument/2006/relationships" xmlns:mc="http://schemas.openxmlformats.org/markup-compatibility/2006" xmlns:mv="urn:schemas-microsoft-com:mac:vml" xmlns:p="http://schemas.openxmlformats.org/presentationml/2006/main" xmlns:c="http://schemas.openxmlformats.org/drawingml/2006/chart" xmlns:dgm="http://schemas.openxmlformats.org/drawingml/2006/diagram" xmlns:o="urn:schemas-microsoft-com:office:office" xmlns:v="urn:schemas-microsoft-com:vml" xmlns:pvml="urn:schemas-microsoft-com:office:powerpoint" xmlns:com="http://schemas.openxmlformats.org/drawingml/2006/compatibility" xmlns:p14="http://schemas.microsoft.com/office/powerpoint/2010/main" xmlns:p15="http://schemas.microsoft.com/office/powerpoint/2012/main" xmlns:ahyp="http://schemas.microsoft.com/office/drawing/2018/hyperlinkcolor" autoCompressPictures="0" embedTrueTypeFonts="1" strictFirstAndLastChars="0" saveSubsetFonts="1">
   <p:sldMasterIdLst>
-    <p:sldMasterId id="2147483659" r:id="rId4"/>
+    <p:sldMasterId id="2147483659" r:id="rId5"/>
   </p:sldMasterIdLst>
   <p:notesMasterIdLst>
-    <p:notesMasterId r:id="rId5"/>
+    <p:notesMasterId r:id="rId6"/>
   </p:notesMasterIdLst>
   <p:sldIdLst>
-    <p:sldId id="256" r:id="rId6"/>
-    <p:sldId id="257" r:id="rId7"/>
-    <p:sldId id="258" r:id="rId8"/>
-    <p:sldId id="259" r:id="rId9"/>
-    <p:sldId id="260" r:id="rId10"/>
-    <p:sldId id="261" r:id="rId11"/>
-    <p:sldId id="262" r:id="rId12"/>
+    <p:sldId id="256" r:id="rId7"/>
+    <p:sldId id="257" r:id="rId8"/>
+    <p:sldId id="258" r:id="rId9"/>
+    <p:sldId id="259" r:id="rId10"/>
+    <p:sldId id="260" r:id="rId11"/>
+    <p:sldId id="261" r:id="rId12"/>
+    <p:sldId id="262" r:id="rId13"/>
+    <p:sldId id="263" r:id="rId14"/>
   </p:sldIdLst>
   <p:sldSz cy="5143500" cx="9144000"/>
   <p:notesSz cx="6858000" cy="9144000"/>
   <p:embeddedFontLst>
     <p:embeddedFont>
       <p:font typeface="Montserrat"/>
-      <p:regular r:id="rId13"/>
-      <p:bold r:id="rId14"/>
-      <p:italic r:id="rId15"/>
-      <p:boldItalic r:id="rId16"/>
+      <p:regular r:id="rId15"/>
+      <p:bold r:id="rId16"/>
+      <p:italic r:id="rId17"/>
+      <p:boldItalic r:id="rId18"/>
     </p:embeddedFont>
     <p:embeddedFont>
       <p:font typeface="Lato"/>
-      <p:regular r:id="rId17"/>
-      <p:bold r:id="rId18"/>
-      <p:italic r:id="rId19"/>
-      <p:boldItalic r:id="rId20"/>
+      <p:regular r:id="rId19"/>
+      <p:bold r:id="rId20"/>
+      <p:italic r:id="rId21"/>
+      <p:boldItalic r:id="rId22"/>
     </p:embeddedFont>
   </p:embeddedFontLst>
   <p:defaultTextStyle>
@@ -925,7 +926,7 @@
       </p:grpSpPr>
       <p:sp>
         <p:nvSpPr>
-          <p:cNvPr id="143" name="Google Shape;143;g53625ce519_0_345:notes"/>
+          <p:cNvPr id="143" name="Google Shape;143;g53625ce519_0_357:notes"/>
           <p:cNvSpPr/>
           <p:nvPr>
             <p:ph idx="2" type="sldImg"/>
@@ -960,7 +961,7 @@
       </p:sp>
       <p:sp>
         <p:nvSpPr>
-          <p:cNvPr id="144" name="Google Shape;144;g53625ce519_0_345:notes"/>
+          <p:cNvPr id="144" name="Google Shape;144;g53625ce519_0_357:notes"/>
           <p:cNvSpPr txBox="1"/>
           <p:nvPr>
             <p:ph idx="1" type="body"/>
@@ -1010,7 +1011,7 @@
   <p:cSld>
     <p:spTree>
       <p:nvGrpSpPr>
-        <p:cNvPr id="149" name="Shape 149"/>
+        <p:cNvPr id="152" name="Shape 152"/>
         <p:cNvGrpSpPr/>
         <p:nvPr/>
       </p:nvGrpSpPr>
@@ -1024,7 +1025,7 @@
       </p:grpSpPr>
       <p:sp>
         <p:nvSpPr>
-          <p:cNvPr id="150" name="Google Shape;150;g53625ce519_0_352:notes"/>
+          <p:cNvPr id="153" name="Google Shape;153;g9d1344d82a_0_3:notes"/>
           <p:cNvSpPr/>
           <p:nvPr>
             <p:ph idx="2" type="sldImg"/>
@@ -1059,7 +1060,7 @@
       </p:sp>
       <p:sp>
         <p:nvSpPr>
-          <p:cNvPr id="151" name="Google Shape;151;g53625ce519_0_352:notes"/>
+          <p:cNvPr id="154" name="Google Shape;154;g9d1344d82a_0_3:notes"/>
           <p:cNvSpPr txBox="1"/>
           <p:nvPr>
             <p:ph idx="1" type="body"/>
@@ -1109,7 +1110,7 @@
   <p:cSld>
     <p:spTree>
       <p:nvGrpSpPr>
-        <p:cNvPr id="155" name="Shape 155"/>
+        <p:cNvPr id="158" name="Shape 158"/>
         <p:cNvGrpSpPr/>
         <p:nvPr/>
       </p:nvGrpSpPr>
@@ -1123,7 +1124,7 @@
       </p:grpSpPr>
       <p:sp>
         <p:nvSpPr>
-          <p:cNvPr id="156" name="Google Shape;156;g53625ce519_0_357:notes"/>
+          <p:cNvPr id="159" name="Google Shape;159;g9d1344d82a_0_8:notes"/>
           <p:cNvSpPr/>
           <p:nvPr>
             <p:ph idx="2" type="sldImg"/>
@@ -1158,7 +1159,7 @@
       </p:sp>
       <p:sp>
         <p:nvSpPr>
-          <p:cNvPr id="157" name="Google Shape;157;g53625ce519_0_357:notes"/>
+          <p:cNvPr id="160" name="Google Shape;160;g9d1344d82a_0_8:notes"/>
           <p:cNvSpPr txBox="1"/>
           <p:nvPr>
             <p:ph idx="1" type="body"/>
@@ -1208,7 +1209,7 @@
   <p:cSld>
     <p:spTree>
       <p:nvGrpSpPr>
-        <p:cNvPr id="163" name="Shape 163"/>
+        <p:cNvPr id="164" name="Shape 164"/>
         <p:cNvGrpSpPr/>
         <p:nvPr/>
       </p:nvGrpSpPr>
@@ -1222,7 +1223,7 @@
       </p:grpSpPr>
       <p:sp>
         <p:nvSpPr>
-          <p:cNvPr id="164" name="Google Shape;164;g53625ce519_0_362:notes"/>
+          <p:cNvPr id="165" name="Google Shape;165;g9d1344d82a_0_15:notes"/>
           <p:cNvSpPr/>
           <p:nvPr>
             <p:ph idx="2" type="sldImg"/>
@@ -1257,7 +1258,7 @@
       </p:sp>
       <p:sp>
         <p:nvSpPr>
-          <p:cNvPr id="165" name="Google Shape;165;g53625ce519_0_362:notes"/>
+          <p:cNvPr id="166" name="Google Shape;166;g9d1344d82a_0_15:notes"/>
           <p:cNvSpPr txBox="1"/>
           <p:nvPr>
             <p:ph idx="1" type="body"/>
@@ -1321,7 +1322,7 @@
       </p:grpSpPr>
       <p:sp>
         <p:nvSpPr>
-          <p:cNvPr id="171" name="Google Shape;171;g53625ce519_0_367:notes"/>
+          <p:cNvPr id="171" name="Google Shape;171;g53625ce519_0_345:notes"/>
           <p:cNvSpPr/>
           <p:nvPr>
             <p:ph idx="2" type="sldImg"/>
@@ -1356,7 +1357,106 @@
       </p:sp>
       <p:sp>
         <p:nvSpPr>
-          <p:cNvPr id="172" name="Google Shape;172;g53625ce519_0_367:notes"/>
+          <p:cNvPr id="172" name="Google Shape;172;g53625ce519_0_345:notes"/>
+          <p:cNvSpPr txBox="1"/>
+          <p:nvPr>
+            <p:ph idx="1" type="body"/>
+          </p:nvPr>
+        </p:nvSpPr>
+        <p:spPr>
+          <a:xfrm>
+            <a:off x="685800" y="4343400"/>
+            <a:ext cx="5486400" cy="4114800"/>
+          </a:xfrm>
+          <a:prstGeom prst="rect">
+            <a:avLst/>
+          </a:prstGeom>
+        </p:spPr>
+        <p:txBody>
+          <a:bodyPr anchorCtr="0" anchor="t" bIns="91425" lIns="91425" spcFirstLastPara="1" rIns="91425" wrap="square" tIns="91425">
+            <a:noAutofit/>
+          </a:bodyPr>
+          <a:lstStyle/>
+          <a:p>
+            <a:pPr indent="0" lvl="0" marL="0" rtl="0" algn="l">
+              <a:spcBef>
+                <a:spcPts val="0"/>
+              </a:spcBef>
+              <a:spcAft>
+                <a:spcPts val="0"/>
+              </a:spcAft>
+              <a:buNone/>
+            </a:pPr>
+            <a:r>
+              <a:t/>
+            </a:r>
+            <a:endParaRPr/>
+          </a:p>
+        </p:txBody>
+      </p:sp>
+    </p:spTree>
+  </p:cSld>
+  <p:clrMapOvr>
+    <a:masterClrMapping/>
+  </p:clrMapOvr>
+</p:notes>
+</file>
+
+<file path=ppt/notesSlides/notesSlide8.xml><?xml version="1.0" encoding="utf-8"?>
+<p:notes xmlns:a="http://schemas.openxmlformats.org/drawingml/2006/main" xmlns:r="http://schemas.openxmlformats.org/officeDocument/2006/relationships" xmlns:mc="http://schemas.openxmlformats.org/markup-compatibility/2006" xmlns:mv="urn:schemas-microsoft-com:mac:vml" xmlns:p="http://schemas.openxmlformats.org/presentationml/2006/main" xmlns:c="http://schemas.openxmlformats.org/drawingml/2006/chart" xmlns:dgm="http://schemas.openxmlformats.org/drawingml/2006/diagram" xmlns:o="urn:schemas-microsoft-com:office:office" xmlns:v="urn:schemas-microsoft-com:vml" xmlns:pvml="urn:schemas-microsoft-com:office:powerpoint" xmlns:com="http://schemas.openxmlformats.org/drawingml/2006/compatibility" xmlns:p14="http://schemas.microsoft.com/office/powerpoint/2010/main" xmlns:p15="http://schemas.microsoft.com/office/powerpoint/2012/main" xmlns:ahyp="http://schemas.microsoft.com/office/drawing/2018/hyperlinkcolor" showMasterPhAnim="0" showMasterSp="0">
+  <p:cSld>
+    <p:spTree>
+      <p:nvGrpSpPr>
+        <p:cNvPr id="176" name="Shape 176"/>
+        <p:cNvGrpSpPr/>
+        <p:nvPr/>
+      </p:nvGrpSpPr>
+      <p:grpSpPr>
+        <a:xfrm>
+          <a:off x="0" y="0"/>
+          <a:ext cx="0" cy="0"/>
+          <a:chOff x="0" y="0"/>
+          <a:chExt cx="0" cy="0"/>
+        </a:xfrm>
+      </p:grpSpPr>
+      <p:sp>
+        <p:nvSpPr>
+          <p:cNvPr id="177" name="Google Shape;177;g53625ce519_0_367:notes"/>
+          <p:cNvSpPr/>
+          <p:nvPr>
+            <p:ph idx="2" type="sldImg"/>
+          </p:nvPr>
+        </p:nvSpPr>
+        <p:spPr>
+          <a:xfrm>
+            <a:off x="381300" y="685800"/>
+            <a:ext cx="6096000" cy="3429000"/>
+          </a:xfrm>
+          <a:custGeom>
+            <a:rect b="b" l="l" r="r" t="t"/>
+            <a:pathLst>
+              <a:path extrusionOk="0" h="120000" w="120000">
+                <a:moveTo>
+                  <a:pt x="0" y="0"/>
+                </a:moveTo>
+                <a:lnTo>
+                  <a:pt x="120000" y="0"/>
+                </a:lnTo>
+                <a:lnTo>
+                  <a:pt x="120000" y="120000"/>
+                </a:lnTo>
+                <a:lnTo>
+                  <a:pt x="0" y="120000"/>
+                </a:lnTo>
+                <a:close/>
+              </a:path>
+            </a:pathLst>
+          </a:custGeom>
+        </p:spPr>
+      </p:sp>
+      <p:sp>
+        <p:nvSpPr>
+          <p:cNvPr id="178" name="Google Shape;178;g53625ce519_0_367:notes"/>
           <p:cNvSpPr txBox="1"/>
           <p:nvPr>
             <p:ph idx="1" type="body"/>
@@ -9796,7 +9896,7 @@
             </a:pPr>
             <a:r>
               <a:rPr lang="en" sz="1800"/>
-              <a:t>Big Mountain Resort recently build a new chair which increased operating costs by $1,540,000.</a:t>
+              <a:t>Big Mountain Resort recently built a new chair which increased operating costs by $1,540,000.</a:t>
             </a:r>
             <a:endParaRPr sz="1800"/>
           </a:p>
@@ -9895,14 +9995,22 @@
             </a:pPr>
             <a:r>
               <a:rPr lang="en"/>
-              <a:t>Recommendations</a:t>
+              <a:t>Models Tested</a:t>
             </a:r>
-            <a:br>
-              <a:rPr lang="en"/>
-            </a:br>
+            <a:endParaRPr/>
+          </a:p>
+          <a:p>
+            <a:pPr indent="0" lvl="0" marL="0" rtl="0" algn="l">
+              <a:spcBef>
+                <a:spcPts val="0"/>
+              </a:spcBef>
+              <a:spcAft>
+                <a:spcPts val="0"/>
+              </a:spcAft>
+              <a:buNone/>
+            </a:pPr>
             <a:r>
-              <a:rPr lang="en"/>
-              <a:t>and Findings</a:t>
+              <a:t/>
             </a:r>
             <a:endParaRPr/>
           </a:p>
@@ -9918,8 +10026,8 @@
         </p:nvSpPr>
         <p:spPr>
           <a:xfrm>
-            <a:off x="1297500" y="1567550"/>
-            <a:ext cx="7038900" cy="3367500"/>
+            <a:off x="1079450" y="901925"/>
+            <a:ext cx="7038900" cy="2911200"/>
           </a:xfrm>
           <a:prstGeom prst="rect">
             <a:avLst/>
@@ -9931,114 +10039,43 @@
           </a:bodyPr>
           <a:lstStyle/>
           <a:p>
-            <a:pPr indent="-317500" lvl="0" marL="457200" rtl="0" algn="l">
-              <a:spcBef>
-                <a:spcPts val="0"/>
-              </a:spcBef>
-              <a:spcAft>
-                <a:spcPts val="0"/>
-              </a:spcAft>
-              <a:buSzPts val="1400"/>
-              <a:buChar char="●"/>
+            <a:pPr indent="0" lvl="0" marL="0" rtl="0" algn="l">
+              <a:spcBef>
+                <a:spcPts val="0"/>
+              </a:spcBef>
+              <a:spcAft>
+                <a:spcPts val="0"/>
+              </a:spcAft>
+              <a:buNone/>
             </a:pPr>
             <a:r>
-              <a:rPr lang="en" sz="1400"/>
-              <a:t>Our model found the most important</a:t>
+              <a:rPr lang="en"/>
+              <a:t>We evaluated two models, linear regression and random </a:t>
             </a:r>
-            <a:br>
-              <a:rPr lang="en" sz="1400"/>
-            </a:br>
             <a:r>
-              <a:rPr lang="en" sz="1400"/>
-              <a:t>features are the number of fast quads</a:t>
+              <a:rPr lang="en"/>
+              <a:t>forest</a:t>
             </a:r>
-            <a:br>
-              <a:rPr lang="en" sz="1400"/>
-            </a:br>
             <a:r>
-              <a:rPr lang="en" sz="1400"/>
-              <a:t>and runs the resort has.</a:t>
+              <a:rPr lang="en"/>
+              <a:t> regressor</a:t>
             </a:r>
-            <a:endParaRPr sz="1400"/>
+            <a:endParaRPr/>
           </a:p>
           <a:p>
-            <a:pPr indent="-317500" lvl="0" marL="457200" rtl="0" algn="l">
-              <a:spcBef>
-                <a:spcPts val="0"/>
-              </a:spcBef>
-              <a:spcAft>
-                <a:spcPts val="0"/>
-              </a:spcAft>
-              <a:buSzPts val="1400"/>
-              <a:buChar char="●"/>
+            <a:pPr indent="0" lvl="0" marL="0" rtl="0" algn="l">
+              <a:spcBef>
+                <a:spcPts val="1600"/>
+              </a:spcBef>
+              <a:spcAft>
+                <a:spcPts val="1600"/>
+              </a:spcAft>
+              <a:buNone/>
             </a:pPr>
             <a:r>
-              <a:rPr lang="en" sz="1400"/>
-              <a:t>Big Mountain Resort should change</a:t>
+              <a:t/>
             </a:r>
-            <a:br>
-              <a:rPr lang="en" sz="1400"/>
-            </a:br>
-            <a:r>
-              <a:rPr lang="en" sz="1400"/>
-              <a:t>its ticket price to $95.84</a:t>
-            </a:r>
-            <a:endParaRPr sz="1400"/>
-          </a:p>
-          <a:p>
-            <a:pPr indent="-317500" lvl="0" marL="457200" rtl="0" algn="l">
-              <a:spcBef>
-                <a:spcPts val="0"/>
-              </a:spcBef>
-              <a:spcAft>
-                <a:spcPts val="0"/>
-              </a:spcAft>
-              <a:buSzPts val="1400"/>
-              <a:buChar char="●"/>
-            </a:pPr>
-            <a:r>
-              <a:rPr lang="en" sz="1400"/>
-              <a:t>They should also implement their</a:t>
-            </a:r>
-            <a:br>
-              <a:rPr lang="en" sz="1400"/>
-            </a:br>
-            <a:r>
-              <a:rPr lang="en" sz="1400"/>
-              <a:t>second scenario they presented </a:t>
-            </a:r>
-            <a:br>
-              <a:rPr lang="en" sz="1400"/>
-            </a:br>
-            <a:r>
-              <a:rPr lang="en" sz="1400"/>
-              <a:t>and increase ticket prices by an</a:t>
-            </a:r>
-            <a:br>
-              <a:rPr lang="en" sz="1400"/>
-            </a:br>
-            <a:r>
-              <a:rPr lang="en" sz="1400"/>
-              <a:t>additional $8.61</a:t>
-            </a:r>
-            <a:endParaRPr sz="1400"/>
-          </a:p>
-          <a:p>
-            <a:pPr indent="-317500" lvl="0" marL="457200" rtl="0" algn="l">
-              <a:spcBef>
-                <a:spcPts val="0"/>
-              </a:spcBef>
-              <a:spcAft>
-                <a:spcPts val="0"/>
-              </a:spcAft>
-              <a:buSzPts val="1400"/>
-              <a:buChar char="●"/>
-            </a:pPr>
-            <a:r>
-              <a:rPr lang="en" sz="1400"/>
-              <a:t>Both of these changes will increase revenue by $41,037,500 per year on top of what the resort currently makes, assuming 350,000 visitors each staying for 5 days</a:t>
-            </a:r>
-            <a:endParaRPr sz="1400"/>
+            <a:endParaRPr/>
           </a:p>
         </p:txBody>
       </p:sp>
@@ -10058,8 +10095,8 @@
         </p:blipFill>
         <p:spPr>
           <a:xfrm>
-            <a:off x="4849425" y="245825"/>
-            <a:ext cx="4198101" cy="3324350"/>
+            <a:off x="316625" y="3288688"/>
+            <a:ext cx="2190750" cy="1171575"/>
           </a:xfrm>
           <a:prstGeom prst="rect">
             <a:avLst/>
@@ -10070,6 +10107,269 @@
           </a:ln>
         </p:spPr>
       </p:pic>
+      <p:sp>
+        <p:nvSpPr>
+          <p:cNvPr id="149" name="Google Shape;149;p15"/>
+          <p:cNvSpPr txBox="1"/>
+          <p:nvPr/>
+        </p:nvSpPr>
+        <p:spPr>
+          <a:xfrm>
+            <a:off x="0" y="1445550"/>
+            <a:ext cx="4652700" cy="2091000"/>
+          </a:xfrm>
+          <a:prstGeom prst="rect">
+            <a:avLst/>
+          </a:prstGeom>
+          <a:noFill/>
+          <a:ln>
+            <a:noFill/>
+          </a:ln>
+        </p:spPr>
+        <p:txBody>
+          <a:bodyPr anchorCtr="0" anchor="t" bIns="91425" lIns="91425" spcFirstLastPara="1" rIns="91425" wrap="square" tIns="91425">
+            <a:noAutofit/>
+          </a:bodyPr>
+          <a:lstStyle/>
+          <a:p>
+            <a:pPr indent="-311150" lvl="0" marL="457200" rtl="0" algn="l">
+              <a:lnSpc>
+                <a:spcPct val="115000"/>
+              </a:lnSpc>
+              <a:spcBef>
+                <a:spcPts val="0"/>
+              </a:spcBef>
+              <a:spcAft>
+                <a:spcPts val="0"/>
+              </a:spcAft>
+              <a:buClr>
+                <a:schemeClr val="lt1"/>
+              </a:buClr>
+              <a:buSzPts val="1300"/>
+              <a:buFont typeface="Lato"/>
+              <a:buChar char="●"/>
+            </a:pPr>
+            <a:r>
+              <a:rPr lang="en" sz="1300">
+                <a:solidFill>
+                  <a:schemeClr val="lt1"/>
+                </a:solidFill>
+                <a:latin typeface="Lato"/>
+                <a:ea typeface="Lato"/>
+                <a:cs typeface="Lato"/>
+                <a:sym typeface="Lato"/>
+              </a:rPr>
+              <a:t>Linear regression gives us a mean absolute error of 10.50 with a standard deviation of 1.62</a:t>
+            </a:r>
+            <a:endParaRPr sz="1300">
+              <a:solidFill>
+                <a:schemeClr val="lt1"/>
+              </a:solidFill>
+              <a:latin typeface="Lato"/>
+              <a:ea typeface="Lato"/>
+              <a:cs typeface="Lato"/>
+              <a:sym typeface="Lato"/>
+            </a:endParaRPr>
+          </a:p>
+          <a:p>
+            <a:pPr indent="-311150" lvl="0" marL="457200" rtl="0" algn="l">
+              <a:lnSpc>
+                <a:spcPct val="115000"/>
+              </a:lnSpc>
+              <a:spcBef>
+                <a:spcPts val="0"/>
+              </a:spcBef>
+              <a:spcAft>
+                <a:spcPts val="0"/>
+              </a:spcAft>
+              <a:buClr>
+                <a:schemeClr val="lt1"/>
+              </a:buClr>
+              <a:buSzPts val="1300"/>
+              <a:buFont typeface="Lato"/>
+              <a:buChar char="●"/>
+            </a:pPr>
+            <a:r>
+              <a:rPr lang="en" sz="1300">
+                <a:solidFill>
+                  <a:schemeClr val="lt1"/>
+                </a:solidFill>
+                <a:latin typeface="Lato"/>
+                <a:ea typeface="Lato"/>
+                <a:cs typeface="Lato"/>
+                <a:sym typeface="Lato"/>
+              </a:rPr>
+              <a:t>From Linear regression, we can see more emphasis is place on vertical drop, snow making ac and total chairs</a:t>
+            </a:r>
+            <a:endParaRPr sz="1300">
+              <a:solidFill>
+                <a:schemeClr val="lt1"/>
+              </a:solidFill>
+              <a:latin typeface="Lato"/>
+              <a:ea typeface="Lato"/>
+              <a:cs typeface="Lato"/>
+              <a:sym typeface="Lato"/>
+            </a:endParaRPr>
+          </a:p>
+        </p:txBody>
+      </p:sp>
+      <p:pic>
+        <p:nvPicPr>
+          <p:cNvPr id="150" name="Google Shape;150;p15"/>
+          <p:cNvPicPr preferRelativeResize="0"/>
+          <p:nvPr/>
+        </p:nvPicPr>
+        <p:blipFill>
+          <a:blip r:embed="rId4">
+            <a:alphaModFix/>
+          </a:blip>
+          <a:stretch>
+            <a:fillRect/>
+          </a:stretch>
+        </p:blipFill>
+        <p:spPr>
+          <a:xfrm>
+            <a:off x="5332213" y="2420538"/>
+            <a:ext cx="3340575" cy="2645300"/>
+          </a:xfrm>
+          <a:prstGeom prst="rect">
+            <a:avLst/>
+          </a:prstGeom>
+          <a:noFill/>
+          <a:ln>
+            <a:noFill/>
+          </a:ln>
+        </p:spPr>
+      </p:pic>
+      <p:sp>
+        <p:nvSpPr>
+          <p:cNvPr id="151" name="Google Shape;151;p15"/>
+          <p:cNvSpPr txBox="1"/>
+          <p:nvPr/>
+        </p:nvSpPr>
+        <p:spPr>
+          <a:xfrm>
+            <a:off x="5056100" y="1445550"/>
+            <a:ext cx="3892800" cy="975000"/>
+          </a:xfrm>
+          <a:prstGeom prst="rect">
+            <a:avLst/>
+          </a:prstGeom>
+          <a:noFill/>
+          <a:ln>
+            <a:noFill/>
+          </a:ln>
+        </p:spPr>
+        <p:txBody>
+          <a:bodyPr anchorCtr="0" anchor="t" bIns="91425" lIns="91425" spcFirstLastPara="1" rIns="91425" wrap="square" tIns="91425">
+            <a:noAutofit/>
+          </a:bodyPr>
+          <a:lstStyle/>
+          <a:p>
+            <a:pPr indent="-311150" lvl="0" marL="457200" rtl="0" algn="l">
+              <a:lnSpc>
+                <a:spcPct val="115000"/>
+              </a:lnSpc>
+              <a:spcBef>
+                <a:spcPts val="0"/>
+              </a:spcBef>
+              <a:spcAft>
+                <a:spcPts val="0"/>
+              </a:spcAft>
+              <a:buClr>
+                <a:schemeClr val="lt1"/>
+              </a:buClr>
+              <a:buSzPts val="1300"/>
+              <a:buFont typeface="Lato"/>
+              <a:buChar char="●"/>
+            </a:pPr>
+            <a:r>
+              <a:rPr lang="en" sz="1300">
+                <a:solidFill>
+                  <a:schemeClr val="lt1"/>
+                </a:solidFill>
+                <a:latin typeface="Lato"/>
+                <a:ea typeface="Lato"/>
+                <a:cs typeface="Lato"/>
+                <a:sym typeface="Lato"/>
+              </a:rPr>
+              <a:t>RFR gave us an mean absolute error of 9.64 and a standard deviation of 1.35</a:t>
+            </a:r>
+            <a:endParaRPr sz="1300">
+              <a:solidFill>
+                <a:schemeClr val="lt1"/>
+              </a:solidFill>
+              <a:latin typeface="Lato"/>
+              <a:ea typeface="Lato"/>
+              <a:cs typeface="Lato"/>
+              <a:sym typeface="Lato"/>
+            </a:endParaRPr>
+          </a:p>
+          <a:p>
+            <a:pPr indent="-311150" lvl="0" marL="457200" rtl="0" algn="l">
+              <a:lnSpc>
+                <a:spcPct val="115000"/>
+              </a:lnSpc>
+              <a:spcBef>
+                <a:spcPts val="0"/>
+              </a:spcBef>
+              <a:spcAft>
+                <a:spcPts val="0"/>
+              </a:spcAft>
+              <a:buClr>
+                <a:schemeClr val="lt1"/>
+              </a:buClr>
+              <a:buSzPts val="1300"/>
+              <a:buFont typeface="Lato"/>
+              <a:buChar char="●"/>
+            </a:pPr>
+            <a:r>
+              <a:rPr lang="en" sz="1300">
+                <a:solidFill>
+                  <a:schemeClr val="lt1"/>
+                </a:solidFill>
+                <a:latin typeface="Lato"/>
+                <a:ea typeface="Lato"/>
+                <a:cs typeface="Lato"/>
+                <a:sym typeface="Lato"/>
+              </a:rPr>
+              <a:t>We can this model places stronger emphasis on fast Quads, runs and snow making ac</a:t>
+            </a:r>
+            <a:endParaRPr sz="1300">
+              <a:solidFill>
+                <a:schemeClr val="lt1"/>
+              </a:solidFill>
+              <a:latin typeface="Lato"/>
+              <a:ea typeface="Lato"/>
+              <a:cs typeface="Lato"/>
+              <a:sym typeface="Lato"/>
+            </a:endParaRPr>
+          </a:p>
+          <a:p>
+            <a:pPr indent="0" lvl="0" marL="457200" rtl="0" algn="l">
+              <a:lnSpc>
+                <a:spcPct val="115000"/>
+              </a:lnSpc>
+              <a:spcBef>
+                <a:spcPts val="1600"/>
+              </a:spcBef>
+              <a:spcAft>
+                <a:spcPts val="1600"/>
+              </a:spcAft>
+              <a:buNone/>
+            </a:pPr>
+            <a:r>
+              <a:t/>
+            </a:r>
+            <a:endParaRPr>
+              <a:latin typeface="Lato"/>
+              <a:ea typeface="Lato"/>
+              <a:cs typeface="Lato"/>
+              <a:sym typeface="Lato"/>
+            </a:endParaRPr>
+          </a:p>
+        </p:txBody>
+      </p:sp>
     </p:spTree>
   </p:cSld>
   <p:clrMapOvr>
@@ -10083,7 +10383,7 @@
   <p:cSld>
     <p:spTree>
       <p:nvGrpSpPr>
-        <p:cNvPr id="152" name="Shape 152"/>
+        <p:cNvPr id="155" name="Shape 155"/>
         <p:cNvGrpSpPr/>
         <p:nvPr/>
       </p:nvGrpSpPr>
@@ -10097,7 +10397,7 @@
       </p:grpSpPr>
       <p:sp>
         <p:nvSpPr>
-          <p:cNvPr id="153" name="Google Shape;153;p16"/>
+          <p:cNvPr id="156" name="Google Shape;156;p16"/>
           <p:cNvSpPr txBox="1"/>
           <p:nvPr>
             <p:ph type="title"/>
@@ -10129,7 +10429,7 @@
             </a:pPr>
             <a:r>
               <a:rPr lang="en"/>
-              <a:t>The New Model</a:t>
+              <a:t>Random Forest Regressor</a:t>
             </a:r>
             <a:endParaRPr/>
           </a:p>
@@ -10137,7 +10437,7 @@
       </p:sp>
       <p:sp>
         <p:nvSpPr>
-          <p:cNvPr id="154" name="Google Shape;154;p16"/>
+          <p:cNvPr id="157" name="Google Shape;157;p16"/>
           <p:cNvSpPr txBox="1"/>
           <p:nvPr>
             <p:ph idx="1" type="body"/>
@@ -10158,63 +10458,55 @@
           </a:bodyPr>
           <a:lstStyle/>
           <a:p>
-            <a:pPr indent="-311150" lvl="0" marL="457200" rtl="0" algn="l">
-              <a:spcBef>
-                <a:spcPts val="0"/>
-              </a:spcBef>
-              <a:spcAft>
-                <a:spcPts val="0"/>
-              </a:spcAft>
-              <a:buSzPts val="1300"/>
+            <a:pPr indent="-336550" lvl="0" marL="457200" rtl="0" algn="l">
+              <a:spcBef>
+                <a:spcPts val="0"/>
+              </a:spcBef>
+              <a:spcAft>
+                <a:spcPts val="0"/>
+              </a:spcAft>
+              <a:buSzPts val="1700"/>
               <a:buChar char="●"/>
             </a:pPr>
             <a:r>
-              <a:rPr lang="en"/>
-              <a:t>The resort’s previous model was to take the average ticket price of other resort’s and add a premium on top of it</a:t>
+              <a:rPr lang="en" sz="1700"/>
+              <a:t>Since RFR has a lower mean error and narrower standard deviation, we will choose this model to determine ticket price</a:t>
             </a:r>
-            <a:endParaRPr/>
+            <a:endParaRPr sz="1700"/>
           </a:p>
           <a:p>
-            <a:pPr indent="-311150" lvl="0" marL="457200" rtl="0" algn="l">
-              <a:spcBef>
-                <a:spcPts val="0"/>
-              </a:spcBef>
-              <a:spcAft>
-                <a:spcPts val="0"/>
-              </a:spcAft>
-              <a:buSzPts val="1300"/>
+            <a:pPr indent="-336550" lvl="0" marL="457200" rtl="0" algn="l">
+              <a:spcBef>
+                <a:spcPts val="0"/>
+              </a:spcBef>
+              <a:spcAft>
+                <a:spcPts val="0"/>
+              </a:spcAft>
+              <a:buSzPts val="1700"/>
               <a:buChar char="●"/>
             </a:pPr>
             <a:r>
-              <a:rPr lang="en"/>
-              <a:t>We need a new way to assign a ticket price to the resort that reflects the amenities the resort has to offer</a:t>
+              <a:rPr lang="en" sz="1700"/>
+              <a:t>Additionally, we noticed that some of the features important to linear regression also appeared near the top for RFR, although in a different order</a:t>
             </a:r>
-            <a:endParaRPr/>
+            <a:endParaRPr sz="1700"/>
           </a:p>
           <a:p>
-            <a:pPr indent="-311150" lvl="0" marL="457200" rtl="0" algn="l">
-              <a:spcBef>
-                <a:spcPts val="0"/>
-              </a:spcBef>
-              <a:spcAft>
-                <a:spcPts val="0"/>
-              </a:spcAft>
-              <a:buSzPts val="1300"/>
+            <a:pPr indent="-336550" lvl="0" marL="457200" rtl="0" algn="l">
+              <a:spcBef>
+                <a:spcPts val="0"/>
+              </a:spcBef>
+              <a:spcAft>
+                <a:spcPts val="0"/>
+              </a:spcAft>
+              <a:buSzPts val="1700"/>
               <a:buChar char="●"/>
             </a:pPr>
             <a:r>
-              <a:rPr lang="en"/>
-              <a:t>We tested two models, Linear Regression and Random Forest Regressor, both will be explained in the </a:t>
+              <a:rPr lang="en" sz="1700"/>
+              <a:t>After training our model and predicting the price given the features Big Mountain Resort has, the ticket price is predicted to be $95.84</a:t>
             </a:r>
-            <a:r>
-              <a:rPr lang="en"/>
-              <a:t>following</a:t>
-            </a:r>
-            <a:r>
-              <a:rPr lang="en"/>
-              <a:t> slides</a:t>
-            </a:r>
-            <a:endParaRPr/>
+            <a:endParaRPr sz="1700"/>
           </a:p>
         </p:txBody>
       </p:sp>
@@ -10231,7 +10523,7 @@
   <p:cSld>
     <p:spTree>
       <p:nvGrpSpPr>
-        <p:cNvPr id="158" name="Shape 158"/>
+        <p:cNvPr id="161" name="Shape 161"/>
         <p:cNvGrpSpPr/>
         <p:nvPr/>
       </p:nvGrpSpPr>
@@ -10245,7 +10537,7 @@
       </p:grpSpPr>
       <p:sp>
         <p:nvSpPr>
-          <p:cNvPr id="159" name="Google Shape;159;p17"/>
+          <p:cNvPr id="162" name="Google Shape;162;p17"/>
           <p:cNvSpPr txBox="1"/>
           <p:nvPr>
             <p:ph type="title"/>
@@ -10277,175 +10569,683 @@
             </a:pPr>
             <a:r>
               <a:rPr lang="en"/>
-              <a:t>Linear Regression</a:t>
-            </a:r>
-            <a:endParaRPr/>
-          </a:p>
-          <a:p>
-            <a:pPr indent="0" lvl="0" marL="0" rtl="0" algn="l">
-              <a:spcBef>
-                <a:spcPts val="0"/>
-              </a:spcBef>
-              <a:spcAft>
-                <a:spcPts val="0"/>
-              </a:spcAft>
-              <a:buNone/>
-            </a:pPr>
-            <a:r>
-              <a:t/>
+              <a:t>Scenarios</a:t>
             </a:r>
             <a:endParaRPr/>
           </a:p>
         </p:txBody>
       </p:sp>
-      <p:sp>
-        <p:nvSpPr>
-          <p:cNvPr id="160" name="Google Shape;160;p17"/>
-          <p:cNvSpPr txBox="1"/>
-          <p:nvPr>
-            <p:ph idx="1" type="body"/>
-          </p:nvPr>
-        </p:nvSpPr>
-        <p:spPr>
-          <a:xfrm>
-            <a:off x="1297500" y="1567550"/>
-            <a:ext cx="7038900" cy="2911200"/>
-          </a:xfrm>
-          <a:prstGeom prst="rect">
-            <a:avLst/>
-          </a:prstGeom>
-        </p:spPr>
-        <p:txBody>
-          <a:bodyPr anchorCtr="0" anchor="t" bIns="91425" lIns="91425" spcFirstLastPara="1" rIns="91425" wrap="square" tIns="91425">
-            <a:noAutofit/>
-          </a:bodyPr>
-          <a:lstStyle/>
-          <a:p>
-            <a:pPr indent="-311150" lvl="0" marL="457200" rtl="0" algn="l">
-              <a:spcBef>
-                <a:spcPts val="0"/>
-              </a:spcBef>
-              <a:spcAft>
-                <a:spcPts val="0"/>
-              </a:spcAft>
-              <a:buSzPts val="1300"/>
-              <a:buChar char="●"/>
-            </a:pPr>
-            <a:r>
-              <a:rPr lang="en"/>
-              <a:t>Trained the linear regression model with cross validation of 5 folds, this gives us an idea of how well the model can train and predict our data</a:t>
-            </a:r>
-            <a:endParaRPr/>
-          </a:p>
-          <a:p>
-            <a:pPr indent="-311150" lvl="0" marL="457200" rtl="0" algn="l">
-              <a:spcBef>
-                <a:spcPts val="0"/>
-              </a:spcBef>
-              <a:spcAft>
-                <a:spcPts val="0"/>
-              </a:spcAft>
-              <a:buSzPts val="1300"/>
-              <a:buChar char="●"/>
-            </a:pPr>
-            <a:r>
-              <a:rPr lang="en"/>
-              <a:t>Tests were performed and determined the model works best when only focusing on 8 features</a:t>
-            </a:r>
-            <a:endParaRPr/>
-          </a:p>
-          <a:p>
-            <a:pPr indent="-311150" lvl="0" marL="457200" rtl="0" algn="l">
-              <a:spcBef>
-                <a:spcPts val="0"/>
-              </a:spcBef>
-              <a:spcAft>
-                <a:spcPts val="0"/>
-              </a:spcAft>
-              <a:buSzPts val="1300"/>
-              <a:buChar char="●"/>
-            </a:pPr>
-            <a:r>
-              <a:rPr lang="en"/>
-              <a:t>Linear regression gives us a mean absolute error of 10.50 with a standard deviation of 1.62</a:t>
-            </a:r>
-            <a:endParaRPr/>
-          </a:p>
-          <a:p>
-            <a:pPr indent="-311150" lvl="0" marL="457200" rtl="0" algn="l">
-              <a:spcBef>
-                <a:spcPts val="0"/>
-              </a:spcBef>
-              <a:spcAft>
-                <a:spcPts val="0"/>
-              </a:spcAft>
-              <a:buSzPts val="1300"/>
-              <a:buChar char="●"/>
-            </a:pPr>
-            <a:r>
-              <a:rPr lang="en"/>
-              <a:t>This tells us on predict price was wrong on average by about $10.50</a:t>
-            </a:r>
-            <a:endParaRPr/>
-          </a:p>
-        </p:txBody>
-      </p:sp>
-      <p:pic>
-        <p:nvPicPr>
-          <p:cNvPr id="161" name="Google Shape;161;p17"/>
-          <p:cNvPicPr preferRelativeResize="0"/>
+      <p:graphicFrame>
+        <p:nvGraphicFramePr>
+          <p:cNvPr id="163" name="Google Shape;163;p17"/>
+          <p:cNvGraphicFramePr/>
           <p:nvPr/>
-        </p:nvPicPr>
-        <p:blipFill>
-          <a:blip r:embed="rId3">
-            <a:alphaModFix/>
-          </a:blip>
-          <a:stretch>
-            <a:fillRect/>
-          </a:stretch>
-        </p:blipFill>
-        <p:spPr>
-          <a:xfrm>
-            <a:off x="6488800" y="291938"/>
-            <a:ext cx="2190750" cy="1171575"/>
-          </a:xfrm>
-          <a:prstGeom prst="rect">
-            <a:avLst/>
-          </a:prstGeom>
-          <a:noFill/>
-          <a:ln>
-            <a:noFill/>
-          </a:ln>
-        </p:spPr>
-      </p:pic>
-      <p:pic>
-        <p:nvPicPr>
-          <p:cNvPr id="162" name="Google Shape;162;p17"/>
-          <p:cNvPicPr preferRelativeResize="0"/>
-          <p:nvPr/>
-        </p:nvPicPr>
-        <p:blipFill>
-          <a:blip r:embed="rId4">
-            <a:alphaModFix/>
-          </a:blip>
-          <a:stretch>
-            <a:fillRect/>
-          </a:stretch>
-        </p:blipFill>
-        <p:spPr>
-          <a:xfrm>
-            <a:off x="2753024" y="3306024"/>
-            <a:ext cx="3298150" cy="1759375"/>
-          </a:xfrm>
-          <a:prstGeom prst="rect">
-            <a:avLst/>
-          </a:prstGeom>
-          <a:noFill/>
-          <a:ln>
-            <a:noFill/>
-          </a:ln>
-        </p:spPr>
-      </p:pic>
+        </p:nvGraphicFramePr>
+        <p:xfrm>
+          <a:off x="472100" y="1614775"/>
+          <a:ext cx="3000000" cy="3000000"/>
+        </p:xfrm>
+        <a:graphic>
+          <a:graphicData uri="http://schemas.openxmlformats.org/drawingml/2006/table">
+            <a:tbl>
+              <a:tblPr>
+                <a:noFill/>
+                <a:tableStyleId>{B3502666-1FFB-4024-973D-63C2643DCD1F}</a:tableStyleId>
+              </a:tblPr>
+              <a:tblGrid>
+                <a:gridCol w="1144125"/>
+                <a:gridCol w="2656950"/>
+                <a:gridCol w="2500875"/>
+                <a:gridCol w="2093525"/>
+              </a:tblGrid>
+              <a:tr h="581400">
+                <a:tc>
+                  <a:txBody>
+                    <a:bodyPr/>
+                    <a:lstStyle/>
+                    <a:p>
+                      <a:pPr indent="0" lvl="0" marL="0" rtl="0" algn="l">
+                        <a:spcBef>
+                          <a:spcPts val="0"/>
+                        </a:spcBef>
+                        <a:spcAft>
+                          <a:spcPts val="0"/>
+                        </a:spcAft>
+                        <a:buNone/>
+                      </a:pPr>
+                      <a:r>
+                        <a:rPr lang="en" sz="1200">
+                          <a:solidFill>
+                            <a:srgbClr val="FFFFFF"/>
+                          </a:solidFill>
+                        </a:rPr>
+                        <a:t>Scenario 1</a:t>
+                      </a:r>
+                      <a:endParaRPr sz="1200">
+                        <a:solidFill>
+                          <a:srgbClr val="FFFFFF"/>
+                        </a:solidFill>
+                      </a:endParaRPr>
+                    </a:p>
+                  </a:txBody>
+                  <a:tcPr marT="91425" marB="91425" marR="91425" marL="91425" anchor="ctr"/>
+                </a:tc>
+                <a:tc>
+                  <a:txBody>
+                    <a:bodyPr/>
+                    <a:lstStyle/>
+                    <a:p>
+                      <a:pPr indent="0" lvl="0" marL="0" rtl="0" algn="l">
+                        <a:spcBef>
+                          <a:spcPts val="0"/>
+                        </a:spcBef>
+                        <a:spcAft>
+                          <a:spcPts val="0"/>
+                        </a:spcAft>
+                        <a:buNone/>
+                      </a:pPr>
+                      <a:r>
+                        <a:rPr lang="en" sz="1200">
+                          <a:solidFill>
+                            <a:srgbClr val="FFFFFF"/>
+                          </a:solidFill>
+                        </a:rPr>
+                        <a:t>Close down 10 runs</a:t>
+                      </a:r>
+                      <a:endParaRPr sz="1200">
+                        <a:solidFill>
+                          <a:srgbClr val="FFFFFF"/>
+                        </a:solidFill>
+                      </a:endParaRPr>
+                    </a:p>
+                  </a:txBody>
+                  <a:tcPr marT="91425" marB="91425" marR="91425" marL="91425" anchor="ctr"/>
+                </a:tc>
+                <a:tc>
+                  <a:txBody>
+                    <a:bodyPr/>
+                    <a:lstStyle/>
+                    <a:p>
+                      <a:pPr indent="0" lvl="0" marL="0" rtl="0" algn="l">
+                        <a:spcBef>
+                          <a:spcPts val="0"/>
+                        </a:spcBef>
+                        <a:spcAft>
+                          <a:spcPts val="0"/>
+                        </a:spcAft>
+                        <a:buNone/>
+                      </a:pPr>
+                      <a:r>
+                        <a:rPr lang="en" sz="1200">
+                          <a:solidFill>
+                            <a:srgbClr val="FFFFFF"/>
+                          </a:solidFill>
+                        </a:rPr>
+                        <a:t>Lower ticket price up to $1.82</a:t>
+                      </a:r>
+                      <a:endParaRPr sz="1200">
+                        <a:solidFill>
+                          <a:srgbClr val="FFFFFF"/>
+                        </a:solidFill>
+                      </a:endParaRPr>
+                    </a:p>
+                  </a:txBody>
+                  <a:tcPr marT="91425" marB="91425" marR="91425" marL="91425" anchor="ctr"/>
+                </a:tc>
+                <a:tc>
+                  <a:txBody>
+                    <a:bodyPr/>
+                    <a:lstStyle/>
+                    <a:p>
+                      <a:pPr indent="0" lvl="0" marL="0" rtl="0" algn="l">
+                        <a:spcBef>
+                          <a:spcPts val="0"/>
+                        </a:spcBef>
+                        <a:spcAft>
+                          <a:spcPts val="0"/>
+                        </a:spcAft>
+                        <a:buNone/>
+                      </a:pPr>
+                      <a:r>
+                        <a:rPr lang="en" sz="1200">
+                          <a:solidFill>
+                            <a:srgbClr val="FFFFFF"/>
+                          </a:solidFill>
+                        </a:rPr>
+                        <a:t>Needs Additional Evaluation</a:t>
+                      </a:r>
+                      <a:endParaRPr sz="1200">
+                        <a:solidFill>
+                          <a:srgbClr val="FFFFFF"/>
+                        </a:solidFill>
+                      </a:endParaRPr>
+                    </a:p>
+                  </a:txBody>
+                  <a:tcPr marT="91425" marB="91425" marR="91425" marL="91425" anchor="ctr"/>
+                </a:tc>
+              </a:tr>
+              <a:tr h="756600">
+                <a:tc>
+                  <a:txBody>
+                    <a:bodyPr/>
+                    <a:lstStyle/>
+                    <a:p>
+                      <a:pPr indent="0" lvl="0" marL="0" rtl="0" algn="l">
+                        <a:spcBef>
+                          <a:spcPts val="0"/>
+                        </a:spcBef>
+                        <a:spcAft>
+                          <a:spcPts val="0"/>
+                        </a:spcAft>
+                        <a:buNone/>
+                      </a:pPr>
+                      <a:r>
+                        <a:rPr lang="en" sz="1200">
+                          <a:solidFill>
+                            <a:srgbClr val="FFFFFF"/>
+                          </a:solidFill>
+                        </a:rPr>
+                        <a:t>Scenario 2</a:t>
+                      </a:r>
+                      <a:endParaRPr sz="1200">
+                        <a:solidFill>
+                          <a:srgbClr val="FFFFFF"/>
+                        </a:solidFill>
+                      </a:endParaRPr>
+                    </a:p>
+                  </a:txBody>
+                  <a:tcPr marT="91425" marB="91425" marR="91425" marL="91425" anchor="ctr"/>
+                </a:tc>
+                <a:tc>
+                  <a:txBody>
+                    <a:bodyPr/>
+                    <a:lstStyle/>
+                    <a:p>
+                      <a:pPr indent="0" lvl="0" marL="0" rtl="0" algn="l">
+                        <a:spcBef>
+                          <a:spcPts val="0"/>
+                        </a:spcBef>
+                        <a:spcAft>
+                          <a:spcPts val="0"/>
+                        </a:spcAft>
+                        <a:buNone/>
+                      </a:pPr>
+                      <a:r>
+                        <a:rPr lang="en" sz="1200">
+                          <a:solidFill>
+                            <a:srgbClr val="FFFFFF"/>
+                          </a:solidFill>
+                        </a:rPr>
+                        <a:t>Add new run</a:t>
+                      </a:r>
+                      <a:endParaRPr sz="1200">
+                        <a:solidFill>
+                          <a:srgbClr val="FFFFFF"/>
+                        </a:solidFill>
+                      </a:endParaRPr>
+                    </a:p>
+                    <a:p>
+                      <a:pPr indent="0" lvl="0" marL="0" rtl="0" algn="l">
+                        <a:spcBef>
+                          <a:spcPts val="0"/>
+                        </a:spcBef>
+                        <a:spcAft>
+                          <a:spcPts val="0"/>
+                        </a:spcAft>
+                        <a:buNone/>
+                      </a:pPr>
+                      <a:r>
+                        <a:rPr lang="en" sz="1200">
+                          <a:solidFill>
+                            <a:srgbClr val="FFFFFF"/>
+                          </a:solidFill>
+                        </a:rPr>
+                        <a:t>Add new chair</a:t>
+                      </a:r>
+                      <a:endParaRPr sz="1200">
+                        <a:solidFill>
+                          <a:srgbClr val="FFFFFF"/>
+                        </a:solidFill>
+                      </a:endParaRPr>
+                    </a:p>
+                    <a:p>
+                      <a:pPr indent="0" lvl="0" marL="0" rtl="0" algn="l">
+                        <a:spcBef>
+                          <a:spcPts val="0"/>
+                        </a:spcBef>
+                        <a:spcAft>
+                          <a:spcPts val="0"/>
+                        </a:spcAft>
+                        <a:buNone/>
+                      </a:pPr>
+                      <a:r>
+                        <a:rPr lang="en" sz="1200">
+                          <a:solidFill>
+                            <a:srgbClr val="FFFFFF"/>
+                          </a:solidFill>
+                        </a:rPr>
+                        <a:t>Increase vert drop by 150 ft</a:t>
+                      </a:r>
+                      <a:endParaRPr sz="1200">
+                        <a:solidFill>
+                          <a:srgbClr val="FFFFFF"/>
+                        </a:solidFill>
+                      </a:endParaRPr>
+                    </a:p>
+                  </a:txBody>
+                  <a:tcPr marT="91425" marB="91425" marR="91425" marL="91425" anchor="ctr"/>
+                </a:tc>
+                <a:tc>
+                  <a:txBody>
+                    <a:bodyPr/>
+                    <a:lstStyle/>
+                    <a:p>
+                      <a:pPr indent="0" lvl="0" marL="0" rtl="0" algn="l">
+                        <a:spcBef>
+                          <a:spcPts val="0"/>
+                        </a:spcBef>
+                        <a:spcAft>
+                          <a:spcPts val="0"/>
+                        </a:spcAft>
+                        <a:buNone/>
+                      </a:pPr>
+                      <a:r>
+                        <a:rPr lang="en" sz="1200">
+                          <a:solidFill>
+                            <a:srgbClr val="FFFFFF"/>
+                          </a:solidFill>
+                        </a:rPr>
+                        <a:t>Increase ticket price by $8.61</a:t>
+                      </a:r>
+                      <a:endParaRPr sz="1200">
+                        <a:solidFill>
+                          <a:srgbClr val="FFFFFF"/>
+                        </a:solidFill>
+                      </a:endParaRPr>
+                    </a:p>
+                  </a:txBody>
+                  <a:tcPr marT="91425" marB="91425" marR="91425" marL="91425" anchor="ctr"/>
+                </a:tc>
+                <a:tc>
+                  <a:txBody>
+                    <a:bodyPr/>
+                    <a:lstStyle/>
+                    <a:p>
+                      <a:pPr indent="0" lvl="0" marL="0" rtl="0" algn="l">
+                        <a:spcBef>
+                          <a:spcPts val="0"/>
+                        </a:spcBef>
+                        <a:spcAft>
+                          <a:spcPts val="0"/>
+                        </a:spcAft>
+                        <a:buNone/>
+                      </a:pPr>
+                      <a:r>
+                        <a:rPr lang="en" sz="1200">
+                          <a:solidFill>
+                            <a:srgbClr val="FFFFFF"/>
+                          </a:solidFill>
+                        </a:rPr>
+                        <a:t>Recommend</a:t>
+                      </a:r>
+                      <a:endParaRPr sz="1200">
+                        <a:solidFill>
+                          <a:srgbClr val="FFFFFF"/>
+                        </a:solidFill>
+                      </a:endParaRPr>
+                    </a:p>
+                  </a:txBody>
+                  <a:tcPr marT="91425" marB="91425" marR="91425" marL="91425" anchor="ctr"/>
+                </a:tc>
+              </a:tr>
+              <a:tr h="729300">
+                <a:tc>
+                  <a:txBody>
+                    <a:bodyPr/>
+                    <a:lstStyle/>
+                    <a:p>
+                      <a:pPr indent="0" lvl="0" marL="0" rtl="0" algn="l">
+                        <a:spcBef>
+                          <a:spcPts val="0"/>
+                        </a:spcBef>
+                        <a:spcAft>
+                          <a:spcPts val="0"/>
+                        </a:spcAft>
+                        <a:buNone/>
+                      </a:pPr>
+                      <a:r>
+                        <a:rPr lang="en" sz="1200">
+                          <a:solidFill>
+                            <a:srgbClr val="FFFFFF"/>
+                          </a:solidFill>
+                        </a:rPr>
+                        <a:t>Scenario 3</a:t>
+                      </a:r>
+                      <a:endParaRPr sz="1200"/>
+                    </a:p>
+                  </a:txBody>
+                  <a:tcPr marT="91425" marB="91425" marR="91425" marL="91425" anchor="ctr"/>
+                </a:tc>
+                <a:tc>
+                  <a:txBody>
+                    <a:bodyPr/>
+                    <a:lstStyle/>
+                    <a:p>
+                      <a:pPr indent="0" lvl="0" marL="0" rtl="0" algn="l">
+                        <a:spcBef>
+                          <a:spcPts val="0"/>
+                        </a:spcBef>
+                        <a:spcAft>
+                          <a:spcPts val="0"/>
+                        </a:spcAft>
+                        <a:buNone/>
+                      </a:pPr>
+                      <a:r>
+                        <a:rPr lang="en" sz="1200">
+                          <a:solidFill>
+                            <a:srgbClr val="FFFFFF"/>
+                          </a:solidFill>
+                        </a:rPr>
+                        <a:t>Add new run</a:t>
+                      </a:r>
+                      <a:endParaRPr sz="1200">
+                        <a:solidFill>
+                          <a:srgbClr val="FFFFFF"/>
+                        </a:solidFill>
+                      </a:endParaRPr>
+                    </a:p>
+                    <a:p>
+                      <a:pPr indent="0" lvl="0" marL="0" rtl="0" algn="l">
+                        <a:spcBef>
+                          <a:spcPts val="0"/>
+                        </a:spcBef>
+                        <a:spcAft>
+                          <a:spcPts val="0"/>
+                        </a:spcAft>
+                        <a:buNone/>
+                      </a:pPr>
+                      <a:r>
+                        <a:rPr lang="en" sz="1200">
+                          <a:solidFill>
+                            <a:srgbClr val="FFFFFF"/>
+                          </a:solidFill>
+                        </a:rPr>
+                        <a:t>Add new chair</a:t>
+                      </a:r>
+                      <a:endParaRPr sz="1200">
+                        <a:solidFill>
+                          <a:srgbClr val="FFFFFF"/>
+                        </a:solidFill>
+                      </a:endParaRPr>
+                    </a:p>
+                    <a:p>
+                      <a:pPr indent="0" lvl="0" marL="0" rtl="0" algn="l">
+                        <a:spcBef>
+                          <a:spcPts val="0"/>
+                        </a:spcBef>
+                        <a:spcAft>
+                          <a:spcPts val="0"/>
+                        </a:spcAft>
+                        <a:buNone/>
+                      </a:pPr>
+                      <a:r>
+                        <a:rPr lang="en" sz="1200">
+                          <a:solidFill>
+                            <a:srgbClr val="FFFFFF"/>
+                          </a:solidFill>
+                        </a:rPr>
+                        <a:t>Increase vert drop by 150 ft</a:t>
+                      </a:r>
+                      <a:endParaRPr sz="1200">
+                        <a:solidFill>
+                          <a:srgbClr val="FFFFFF"/>
+                        </a:solidFill>
+                      </a:endParaRPr>
+                    </a:p>
+                    <a:p>
+                      <a:pPr indent="0" lvl="0" marL="0" rtl="0" algn="l">
+                        <a:spcBef>
+                          <a:spcPts val="0"/>
+                        </a:spcBef>
+                        <a:spcAft>
+                          <a:spcPts val="0"/>
+                        </a:spcAft>
+                        <a:buNone/>
+                      </a:pPr>
+                      <a:r>
+                        <a:rPr lang="en" sz="1200">
+                          <a:solidFill>
+                            <a:srgbClr val="FFFFFF"/>
+                          </a:solidFill>
+                        </a:rPr>
+                        <a:t>Increase snow making acreage by 2</a:t>
+                      </a:r>
+                      <a:endParaRPr sz="1200">
+                        <a:solidFill>
+                          <a:srgbClr val="FFFFFF"/>
+                        </a:solidFill>
+                      </a:endParaRPr>
+                    </a:p>
+                  </a:txBody>
+                  <a:tcPr marT="91425" marB="91425" marR="91425" marL="91425" anchor="ctr"/>
+                </a:tc>
+                <a:tc>
+                  <a:txBody>
+                    <a:bodyPr/>
+                    <a:lstStyle/>
+                    <a:p>
+                      <a:pPr indent="0" lvl="0" marL="0" rtl="0" algn="l">
+                        <a:spcBef>
+                          <a:spcPts val="0"/>
+                        </a:spcBef>
+                        <a:spcAft>
+                          <a:spcPts val="0"/>
+                        </a:spcAft>
+                        <a:buNone/>
+                      </a:pPr>
+                      <a:r>
+                        <a:rPr lang="en" sz="1200">
+                          <a:solidFill>
+                            <a:srgbClr val="FFFFFF"/>
+                          </a:solidFill>
+                        </a:rPr>
+                        <a:t>Increase ticket price by $9.90</a:t>
+                      </a:r>
+                      <a:endParaRPr sz="1200">
+                        <a:solidFill>
+                          <a:srgbClr val="FFFFFF"/>
+                        </a:solidFill>
+                      </a:endParaRPr>
+                    </a:p>
+                  </a:txBody>
+                  <a:tcPr marT="91425" marB="91425" marR="91425" marL="91425" anchor="ctr"/>
+                </a:tc>
+                <a:tc>
+                  <a:txBody>
+                    <a:bodyPr/>
+                    <a:lstStyle/>
+                    <a:p>
+                      <a:pPr indent="0" lvl="0" marL="0" rtl="0" algn="l">
+                        <a:spcBef>
+                          <a:spcPts val="0"/>
+                        </a:spcBef>
+                        <a:spcAft>
+                          <a:spcPts val="0"/>
+                        </a:spcAft>
+                        <a:buNone/>
+                      </a:pPr>
+                      <a:r>
+                        <a:rPr lang="en" sz="1200">
+                          <a:solidFill>
+                            <a:srgbClr val="FFFFFF"/>
+                          </a:solidFill>
+                        </a:rPr>
+                        <a:t>Recommend</a:t>
+                      </a:r>
+                      <a:endParaRPr sz="1200">
+                        <a:solidFill>
+                          <a:srgbClr val="FFFFFF"/>
+                        </a:solidFill>
+                      </a:endParaRPr>
+                    </a:p>
+                  </a:txBody>
+                  <a:tcPr marT="91425" marB="91425" marR="91425" marL="91425" anchor="ctr"/>
+                </a:tc>
+              </a:tr>
+              <a:tr h="530375">
+                <a:tc>
+                  <a:txBody>
+                    <a:bodyPr/>
+                    <a:lstStyle/>
+                    <a:p>
+                      <a:pPr indent="0" lvl="0" marL="0" rtl="0" algn="l">
+                        <a:spcBef>
+                          <a:spcPts val="0"/>
+                        </a:spcBef>
+                        <a:spcAft>
+                          <a:spcPts val="0"/>
+                        </a:spcAft>
+                        <a:buNone/>
+                      </a:pPr>
+                      <a:r>
+                        <a:rPr lang="en" sz="1200">
+                          <a:solidFill>
+                            <a:srgbClr val="FFFFFF"/>
+                          </a:solidFill>
+                        </a:rPr>
+                        <a:t>Scenario 4</a:t>
+                      </a:r>
+                      <a:endParaRPr sz="1200">
+                        <a:solidFill>
+                          <a:srgbClr val="FFFFFF"/>
+                        </a:solidFill>
+                      </a:endParaRPr>
+                    </a:p>
+                  </a:txBody>
+                  <a:tcPr marT="91425" marB="91425" marR="91425" marL="91425" anchor="ctr"/>
+                </a:tc>
+                <a:tc>
+                  <a:txBody>
+                    <a:bodyPr/>
+                    <a:lstStyle/>
+                    <a:p>
+                      <a:pPr indent="0" lvl="0" marL="0" rtl="0" algn="l">
+                        <a:spcBef>
+                          <a:spcPts val="0"/>
+                        </a:spcBef>
+                        <a:spcAft>
+                          <a:spcPts val="0"/>
+                        </a:spcAft>
+                        <a:buNone/>
+                      </a:pPr>
+                      <a:r>
+                        <a:rPr lang="en" sz="1200">
+                          <a:solidFill>
+                            <a:srgbClr val="FFFFFF"/>
+                          </a:solidFill>
+                        </a:rPr>
+                        <a:t>Increase longest run by 0.2 miles</a:t>
+                      </a:r>
+                      <a:endParaRPr sz="1200">
+                        <a:solidFill>
+                          <a:srgbClr val="FFFFFF"/>
+                        </a:solidFill>
+                      </a:endParaRPr>
+                    </a:p>
+                    <a:p>
+                      <a:pPr indent="0" lvl="0" marL="0" rtl="0" algn="l">
+                        <a:spcBef>
+                          <a:spcPts val="0"/>
+                        </a:spcBef>
+                        <a:spcAft>
+                          <a:spcPts val="0"/>
+                        </a:spcAft>
+                        <a:buNone/>
+                      </a:pPr>
+                      <a:r>
+                        <a:rPr lang="en" sz="1200">
+                          <a:solidFill>
+                            <a:srgbClr val="FFFFFF"/>
+                          </a:solidFill>
+                        </a:rPr>
+                        <a:t>Increase snow making acreage by 4</a:t>
+                      </a:r>
+                      <a:endParaRPr sz="1200">
+                        <a:solidFill>
+                          <a:srgbClr val="FFFFFF"/>
+                        </a:solidFill>
+                      </a:endParaRPr>
+                    </a:p>
+                  </a:txBody>
+                  <a:tcPr marT="91425" marB="91425" marR="91425" marL="91425" anchor="ctr"/>
+                </a:tc>
+                <a:tc>
+                  <a:txBody>
+                    <a:bodyPr/>
+                    <a:lstStyle/>
+                    <a:p>
+                      <a:pPr indent="0" lvl="0" marL="0" rtl="0" algn="l">
+                        <a:spcBef>
+                          <a:spcPts val="0"/>
+                        </a:spcBef>
+                        <a:spcAft>
+                          <a:spcPts val="0"/>
+                        </a:spcAft>
+                        <a:buNone/>
+                      </a:pPr>
+                      <a:r>
+                        <a:rPr lang="en" sz="1200">
+                          <a:solidFill>
+                            <a:srgbClr val="FFFFFF"/>
+                          </a:solidFill>
+                        </a:rPr>
+                        <a:t>No change in price</a:t>
+                      </a:r>
+                      <a:endParaRPr sz="1200">
+                        <a:solidFill>
+                          <a:srgbClr val="FFFFFF"/>
+                        </a:solidFill>
+                      </a:endParaRPr>
+                    </a:p>
+                  </a:txBody>
+                  <a:tcPr marT="91425" marB="91425" marR="91425" marL="91425" anchor="ctr"/>
+                </a:tc>
+                <a:tc>
+                  <a:txBody>
+                    <a:bodyPr/>
+                    <a:lstStyle/>
+                    <a:p>
+                      <a:pPr indent="0" lvl="0" marL="0" rtl="0" algn="l">
+                        <a:spcBef>
+                          <a:spcPts val="0"/>
+                        </a:spcBef>
+                        <a:spcAft>
+                          <a:spcPts val="0"/>
+                        </a:spcAft>
+                        <a:buNone/>
+                      </a:pPr>
+                      <a:r>
+                        <a:rPr lang="en" sz="1200">
+                          <a:solidFill>
+                            <a:srgbClr val="FFFFFF"/>
+                          </a:solidFill>
+                        </a:rPr>
+                        <a:t>Do Not Recommend</a:t>
+                      </a:r>
+                      <a:endParaRPr sz="1200">
+                        <a:solidFill>
+                          <a:srgbClr val="FFFFFF"/>
+                        </a:solidFill>
+                      </a:endParaRPr>
+                    </a:p>
+                  </a:txBody>
+                  <a:tcPr marT="91425" marB="91425" marR="91425" marL="91425" anchor="ctr"/>
+                </a:tc>
+              </a:tr>
+            </a:tbl>
+          </a:graphicData>
+        </a:graphic>
+      </p:graphicFrame>
     </p:spTree>
   </p:cSld>
   <p:clrMapOvr>
@@ -10459,7 +11259,7 @@
   <p:cSld>
     <p:spTree>
       <p:nvGrpSpPr>
-        <p:cNvPr id="166" name="Shape 166"/>
+        <p:cNvPr id="167" name="Shape 167"/>
         <p:cNvGrpSpPr/>
         <p:nvPr/>
       </p:nvGrpSpPr>
@@ -10473,7 +11273,7 @@
       </p:grpSpPr>
       <p:sp>
         <p:nvSpPr>
-          <p:cNvPr id="167" name="Google Shape;167;p18"/>
+          <p:cNvPr id="168" name="Google Shape;168;p18"/>
           <p:cNvSpPr txBox="1"/>
           <p:nvPr>
             <p:ph type="title"/>
@@ -10505,7 +11305,7 @@
             </a:pPr>
             <a:r>
               <a:rPr lang="en"/>
-              <a:t>Random Forest Regressor</a:t>
+              <a:t>Scenarios</a:t>
             </a:r>
             <a:endParaRPr/>
           </a:p>
@@ -10513,7 +11313,7 @@
       </p:sp>
       <p:sp>
         <p:nvSpPr>
-          <p:cNvPr id="168" name="Google Shape;168;p18"/>
+          <p:cNvPr id="169" name="Google Shape;169;p18"/>
           <p:cNvSpPr txBox="1"/>
           <p:nvPr>
             <p:ph idx="1" type="body"/>
@@ -10534,138 +11334,75 @@
           </a:bodyPr>
           <a:lstStyle/>
           <a:p>
-            <a:pPr indent="-311150" lvl="0" marL="457200" rtl="0" algn="l">
-              <a:spcBef>
-                <a:spcPts val="0"/>
-              </a:spcBef>
-              <a:spcAft>
-                <a:spcPts val="0"/>
-              </a:spcAft>
-              <a:buSzPts val="1300"/>
+            <a:pPr indent="-330200" lvl="0" marL="457200" rtl="0" algn="l">
+              <a:spcBef>
+                <a:spcPts val="0"/>
+              </a:spcBef>
+              <a:spcAft>
+                <a:spcPts val="0"/>
+              </a:spcAft>
+              <a:buSzPts val="1600"/>
               <a:buChar char="●"/>
             </a:pPr>
             <a:r>
-              <a:rPr lang="en"/>
-              <a:t>Random Forest Regressor was also tested with </a:t>
+              <a:rPr lang="en" sz="1600"/>
+              <a:t>The first scenario will need additional information, depending on how much it costs to keep a run open will determine whether it should be closed or not</a:t>
             </a:r>
-            <a:br>
-              <a:rPr lang="en"/>
-            </a:br>
-            <a:r>
-              <a:rPr lang="en"/>
-              <a:t>cross validation of 5 folds</a:t>
-            </a:r>
-            <a:endParaRPr/>
+            <a:endParaRPr sz="1600"/>
           </a:p>
           <a:p>
-            <a:pPr indent="-311150" lvl="0" marL="457200" rtl="0" algn="l">
-              <a:spcBef>
-                <a:spcPts val="0"/>
-              </a:spcBef>
-              <a:spcAft>
-                <a:spcPts val="0"/>
-              </a:spcAft>
-              <a:buSzPts val="1300"/>
+            <a:pPr indent="-330200" lvl="0" marL="457200" rtl="0" algn="l">
+              <a:spcBef>
+                <a:spcPts val="0"/>
+              </a:spcBef>
+              <a:spcAft>
+                <a:spcPts val="0"/>
+              </a:spcAft>
+              <a:buSzPts val="1600"/>
               <a:buChar char="●"/>
             </a:pPr>
             <a:r>
-              <a:rPr lang="en"/>
-              <a:t>Looking at the important features given by </a:t>
+              <a:rPr lang="en" sz="1600"/>
+              <a:t>The second scenario is recommend, it will increase revenue significantly with minor changes</a:t>
             </a:r>
-            <a:br>
-              <a:rPr lang="en"/>
-            </a:br>
-            <a:r>
-              <a:rPr lang="en"/>
-              <a:t>RFR, we can see some overlap with the 8 best</a:t>
-            </a:r>
-            <a:br>
-              <a:rPr lang="en"/>
-            </a:br>
-            <a:r>
-              <a:rPr lang="en"/>
-              <a:t>features from linear regression</a:t>
-            </a:r>
-            <a:endParaRPr/>
+            <a:endParaRPr sz="1600"/>
           </a:p>
           <a:p>
-            <a:pPr indent="-311150" lvl="0" marL="457200" rtl="0" algn="l">
-              <a:spcBef>
-                <a:spcPts val="0"/>
-              </a:spcBef>
-              <a:spcAft>
-                <a:spcPts val="0"/>
-              </a:spcAft>
-              <a:buSzPts val="1300"/>
+            <a:pPr indent="-330200" lvl="0" marL="457200" rtl="0" algn="l">
+              <a:spcBef>
+                <a:spcPts val="0"/>
+              </a:spcBef>
+              <a:spcAft>
+                <a:spcPts val="0"/>
+              </a:spcAft>
+              <a:buSzPts val="1600"/>
               <a:buChar char="●"/>
             </a:pPr>
             <a:r>
-              <a:rPr lang="en"/>
-              <a:t>RFR gave a mean absolute error of 9.64 and</a:t>
+              <a:rPr lang="en" sz="1600"/>
+              <a:t>The third scenario is similar to the second, it is a big bump in ticket price that will help increase revenue</a:t>
             </a:r>
-            <a:br>
-              <a:rPr lang="en"/>
-            </a:br>
-            <a:r>
-              <a:rPr lang="en"/>
-              <a:t>A standard deviation of 1.35</a:t>
-            </a:r>
-            <a:endParaRPr/>
+            <a:endParaRPr sz="1600"/>
           </a:p>
           <a:p>
-            <a:pPr indent="-311150" lvl="0" marL="457200" rtl="0" algn="l">
-              <a:spcBef>
-                <a:spcPts val="0"/>
-              </a:spcBef>
-              <a:spcAft>
-                <a:spcPts val="0"/>
-              </a:spcAft>
-              <a:buSzPts val="1300"/>
+            <a:pPr indent="-330200" lvl="0" marL="457200" rtl="0" algn="l">
+              <a:spcBef>
+                <a:spcPts val="0"/>
+              </a:spcBef>
+              <a:spcAft>
+                <a:spcPts val="0"/>
+              </a:spcAft>
+              <a:buSzPts val="1600"/>
               <a:buChar char="●"/>
             </a:pPr>
             <a:r>
-              <a:rPr lang="en"/>
-              <a:t>Due to a lower mean absolute error</a:t>
+              <a:rPr lang="en" sz="1600"/>
+              <a:t>The fourth scenario is not recommended, it incurs costs while not benefitting the ticket price</a:t>
             </a:r>
-            <a:br>
-              <a:rPr lang="en"/>
-            </a:br>
-            <a:r>
-              <a:rPr lang="en"/>
-              <a:t>and lower standard deviation than linear regression, RFR was decided as the model to predict the ticket price</a:t>
-            </a:r>
-            <a:endParaRPr/>
+            <a:endParaRPr sz="1600"/>
           </a:p>
         </p:txBody>
       </p:sp>
-      <p:pic>
-        <p:nvPicPr>
-          <p:cNvPr id="169" name="Google Shape;169;p18"/>
-          <p:cNvPicPr preferRelativeResize="0"/>
-          <p:nvPr/>
-        </p:nvPicPr>
-        <p:blipFill>
-          <a:blip r:embed="rId3">
-            <a:alphaModFix/>
-          </a:blip>
-          <a:stretch>
-            <a:fillRect/>
-          </a:stretch>
-        </p:blipFill>
-        <p:spPr>
-          <a:xfrm>
-            <a:off x="5418215" y="393750"/>
-            <a:ext cx="3676361" cy="2911200"/>
-          </a:xfrm>
-          <a:prstGeom prst="rect">
-            <a:avLst/>
-          </a:prstGeom>
-          <a:noFill/>
-          <a:ln>
-            <a:noFill/>
-          </a:ln>
-        </p:spPr>
-      </p:pic>
     </p:spTree>
   </p:cSld>
   <p:clrMapOvr>
@@ -10725,6 +11462,170 @@
             </a:pPr>
             <a:r>
               <a:rPr lang="en"/>
+              <a:t>Recommendations</a:t>
+            </a:r>
+            <a:br>
+              <a:rPr lang="en"/>
+            </a:br>
+            <a:r>
+              <a:rPr lang="en"/>
+              <a:t>and Findings</a:t>
+            </a:r>
+            <a:endParaRPr/>
+          </a:p>
+        </p:txBody>
+      </p:sp>
+      <p:sp>
+        <p:nvSpPr>
+          <p:cNvPr id="175" name="Google Shape;175;p19"/>
+          <p:cNvSpPr txBox="1"/>
+          <p:nvPr>
+            <p:ph idx="1" type="body"/>
+          </p:nvPr>
+        </p:nvSpPr>
+        <p:spPr>
+          <a:xfrm>
+            <a:off x="1297500" y="1567550"/>
+            <a:ext cx="7038900" cy="3367500"/>
+          </a:xfrm>
+          <a:prstGeom prst="rect">
+            <a:avLst/>
+          </a:prstGeom>
+        </p:spPr>
+        <p:txBody>
+          <a:bodyPr anchorCtr="0" anchor="t" bIns="91425" lIns="91425" spcFirstLastPara="1" rIns="91425" wrap="square" tIns="91425">
+            <a:noAutofit/>
+          </a:bodyPr>
+          <a:lstStyle/>
+          <a:p>
+            <a:pPr indent="-330200" lvl="0" marL="457200" rtl="0" algn="l">
+              <a:spcBef>
+                <a:spcPts val="0"/>
+              </a:spcBef>
+              <a:spcAft>
+                <a:spcPts val="0"/>
+              </a:spcAft>
+              <a:buSzPts val="1600"/>
+              <a:buChar char="●"/>
+            </a:pPr>
+            <a:r>
+              <a:rPr lang="en" sz="1600"/>
+              <a:t>Our model found the most important features are the number of fast quads and runs the resort has.</a:t>
+            </a:r>
+            <a:endParaRPr sz="1600"/>
+          </a:p>
+          <a:p>
+            <a:pPr indent="-330200" lvl="0" marL="457200" rtl="0" algn="l">
+              <a:spcBef>
+                <a:spcPts val="0"/>
+              </a:spcBef>
+              <a:spcAft>
+                <a:spcPts val="0"/>
+              </a:spcAft>
+              <a:buSzPts val="1600"/>
+              <a:buChar char="●"/>
+            </a:pPr>
+            <a:r>
+              <a:rPr lang="en" sz="1600"/>
+              <a:t>Big Mountain Resort should change its ticket price to $95.84</a:t>
+            </a:r>
+            <a:endParaRPr sz="1600"/>
+          </a:p>
+          <a:p>
+            <a:pPr indent="-330200" lvl="0" marL="457200" rtl="0" algn="l">
+              <a:spcBef>
+                <a:spcPts val="0"/>
+              </a:spcBef>
+              <a:spcAft>
+                <a:spcPts val="0"/>
+              </a:spcAft>
+              <a:buSzPts val="1600"/>
+              <a:buChar char="●"/>
+            </a:pPr>
+            <a:r>
+              <a:rPr lang="en" sz="1600"/>
+              <a:t>They should also implement their second scenario they presented  and increase ticket prices by an additional $8.61</a:t>
+            </a:r>
+            <a:endParaRPr sz="1600"/>
+          </a:p>
+          <a:p>
+            <a:pPr indent="-330200" lvl="0" marL="457200" rtl="0" algn="l">
+              <a:spcBef>
+                <a:spcPts val="0"/>
+              </a:spcBef>
+              <a:spcAft>
+                <a:spcPts val="0"/>
+              </a:spcAft>
+              <a:buSzPts val="1600"/>
+              <a:buChar char="●"/>
+            </a:pPr>
+            <a:r>
+              <a:rPr lang="en" sz="1600"/>
+              <a:t>Both of these changes will increase revenue by $41,037,500 per year on top of what the resort currently makes, assuming 350,000 visitors each staying for 5 days</a:t>
+            </a:r>
+            <a:endParaRPr sz="1600"/>
+          </a:p>
+        </p:txBody>
+      </p:sp>
+    </p:spTree>
+  </p:cSld>
+  <p:clrMapOvr>
+    <a:masterClrMapping/>
+  </p:clrMapOvr>
+</p:sld>
+</file>
+
+<file path=ppt/slides/slide8.xml><?xml version="1.0" encoding="utf-8"?>
+<p:sld xmlns:a="http://schemas.openxmlformats.org/drawingml/2006/main" xmlns:r="http://schemas.openxmlformats.org/officeDocument/2006/relationships" xmlns:mc="http://schemas.openxmlformats.org/markup-compatibility/2006" xmlns:mv="urn:schemas-microsoft-com:mac:vml" xmlns:p="http://schemas.openxmlformats.org/presentationml/2006/main" xmlns:c="http://schemas.openxmlformats.org/drawingml/2006/chart" xmlns:dgm="http://schemas.openxmlformats.org/drawingml/2006/diagram" xmlns:o="urn:schemas-microsoft-com:office:office" xmlns:v="urn:schemas-microsoft-com:vml" xmlns:pvml="urn:schemas-microsoft-com:office:powerpoint" xmlns:com="http://schemas.openxmlformats.org/drawingml/2006/compatibility" xmlns:p14="http://schemas.microsoft.com/office/powerpoint/2010/main" xmlns:p15="http://schemas.microsoft.com/office/powerpoint/2012/main" xmlns:ahyp="http://schemas.microsoft.com/office/drawing/2018/hyperlinkcolor">
+  <p:cSld>
+    <p:spTree>
+      <p:nvGrpSpPr>
+        <p:cNvPr id="179" name="Shape 179"/>
+        <p:cNvGrpSpPr/>
+        <p:nvPr/>
+      </p:nvGrpSpPr>
+      <p:grpSpPr>
+        <a:xfrm>
+          <a:off x="0" y="0"/>
+          <a:ext cx="0" cy="0"/>
+          <a:chOff x="0" y="0"/>
+          <a:chExt cx="0" cy="0"/>
+        </a:xfrm>
+      </p:grpSpPr>
+      <p:sp>
+        <p:nvSpPr>
+          <p:cNvPr id="180" name="Google Shape;180;p20"/>
+          <p:cNvSpPr txBox="1"/>
+          <p:nvPr>
+            <p:ph type="title"/>
+          </p:nvPr>
+        </p:nvSpPr>
+        <p:spPr>
+          <a:xfrm>
+            <a:off x="1297500" y="393750"/>
+            <a:ext cx="7038900" cy="914100"/>
+          </a:xfrm>
+          <a:prstGeom prst="rect">
+            <a:avLst/>
+          </a:prstGeom>
+        </p:spPr>
+        <p:txBody>
+          <a:bodyPr anchorCtr="0" anchor="t" bIns="91425" lIns="91425" spcFirstLastPara="1" rIns="91425" wrap="square" tIns="91425">
+            <a:noAutofit/>
+          </a:bodyPr>
+          <a:lstStyle/>
+          <a:p>
+            <a:pPr indent="0" lvl="0" marL="0" rtl="0" algn="l">
+              <a:spcBef>
+                <a:spcPts val="0"/>
+              </a:spcBef>
+              <a:spcAft>
+                <a:spcPts val="0"/>
+              </a:spcAft>
+              <a:buNone/>
+            </a:pPr>
+            <a:r>
+              <a:rPr lang="en"/>
               <a:t>Conclusion</a:t>
             </a:r>
             <a:endParaRPr/>
@@ -10733,7 +11634,7 @@
       </p:sp>
       <p:sp>
         <p:nvSpPr>
-          <p:cNvPr id="175" name="Google Shape;175;p19"/>
+          <p:cNvPr id="181" name="Google Shape;181;p20"/>
           <p:cNvSpPr txBox="1"/>
           <p:nvPr>
             <p:ph idx="1" type="body"/>
@@ -10754,89 +11655,89 @@
           </a:bodyPr>
           <a:lstStyle/>
           <a:p>
-            <a:pPr indent="-311150" lvl="0" marL="457200" rtl="0" algn="l">
-              <a:spcBef>
-                <a:spcPts val="0"/>
-              </a:spcBef>
-              <a:spcAft>
-                <a:spcPts val="0"/>
-              </a:spcAft>
-              <a:buSzPts val="1300"/>
+            <a:pPr indent="-323850" lvl="0" marL="457200" rtl="0" algn="l">
+              <a:spcBef>
+                <a:spcPts val="0"/>
+              </a:spcBef>
+              <a:spcAft>
+                <a:spcPts val="0"/>
+              </a:spcAft>
+              <a:buSzPts val="1500"/>
               <a:buChar char="●"/>
             </a:pPr>
             <a:r>
-              <a:rPr lang="en"/>
+              <a:rPr lang="en" sz="1500"/>
               <a:t>Using the Random Forest Regressor, we found that it performs better than our Linear Regression model</a:t>
             </a:r>
-            <a:endParaRPr/>
+            <a:endParaRPr sz="1500"/>
           </a:p>
           <a:p>
-            <a:pPr indent="-311150" lvl="0" marL="457200" rtl="0" algn="l">
-              <a:spcBef>
-                <a:spcPts val="0"/>
-              </a:spcBef>
-              <a:spcAft>
-                <a:spcPts val="0"/>
-              </a:spcAft>
-              <a:buSzPts val="1300"/>
+            <a:pPr indent="-323850" lvl="0" marL="457200" rtl="0" algn="l">
+              <a:spcBef>
+                <a:spcPts val="0"/>
+              </a:spcBef>
+              <a:spcAft>
+                <a:spcPts val="0"/>
+              </a:spcAft>
+              <a:buSzPts val="1500"/>
               <a:buChar char="●"/>
             </a:pPr>
             <a:r>
-              <a:rPr lang="en"/>
+              <a:rPr lang="en" sz="1500"/>
               <a:t>The RFR model suggests that the current ticket price should be set to $95.81, an increase of $14.81</a:t>
             </a:r>
-            <a:endParaRPr/>
+            <a:endParaRPr sz="1500"/>
           </a:p>
           <a:p>
-            <a:pPr indent="-311150" lvl="0" marL="457200" rtl="0" algn="l">
-              <a:spcBef>
-                <a:spcPts val="0"/>
-              </a:spcBef>
-              <a:spcAft>
-                <a:spcPts val="0"/>
-              </a:spcAft>
-              <a:buSzPts val="1300"/>
+            <a:pPr indent="-323850" lvl="0" marL="457200" rtl="0" algn="l">
+              <a:spcBef>
+                <a:spcPts val="0"/>
+              </a:spcBef>
+              <a:spcAft>
+                <a:spcPts val="0"/>
+              </a:spcAft>
+              <a:buSzPts val="1500"/>
               <a:buChar char="●"/>
             </a:pPr>
             <a:r>
-              <a:rPr lang="en"/>
+              <a:rPr lang="en" sz="1500"/>
               <a:t>Using the same model, we see that implementing the changes of the second scenario present to us will increase ticket prices by $8.61</a:t>
             </a:r>
-            <a:endParaRPr/>
+            <a:endParaRPr sz="1500"/>
           </a:p>
           <a:p>
-            <a:pPr indent="-311150" lvl="0" marL="457200" rtl="0" algn="l">
-              <a:spcBef>
-                <a:spcPts val="0"/>
-              </a:spcBef>
-              <a:spcAft>
-                <a:spcPts val="0"/>
-              </a:spcAft>
-              <a:buSzPts val="1300"/>
+            <a:pPr indent="-323850" lvl="0" marL="457200" rtl="0" algn="l">
+              <a:spcBef>
+                <a:spcPts val="0"/>
+              </a:spcBef>
+              <a:spcAft>
+                <a:spcPts val="0"/>
+              </a:spcAft>
+              <a:buSzPts val="1500"/>
               <a:buChar char="●"/>
             </a:pPr>
             <a:r>
-              <a:rPr lang="en"/>
+              <a:rPr lang="en" sz="1500"/>
               <a:t>These changes will increase yearly revenue by $25,917,500 and $15,067,500 respectively</a:t>
             </a:r>
-            <a:endParaRPr/>
+            <a:endParaRPr sz="1500"/>
           </a:p>
           <a:p>
-            <a:pPr indent="-311150" lvl="0" marL="457200" rtl="0" algn="l">
-              <a:spcBef>
-                <a:spcPts val="0"/>
-              </a:spcBef>
-              <a:spcAft>
-                <a:spcPts val="0"/>
-              </a:spcAft>
-              <a:buSzPts val="1300"/>
+            <a:pPr indent="-323850" lvl="0" marL="457200" rtl="0" algn="l">
+              <a:spcBef>
+                <a:spcPts val="0"/>
+              </a:spcBef>
+              <a:spcAft>
+                <a:spcPts val="0"/>
+              </a:spcAft>
+              <a:buSzPts val="1500"/>
               <a:buChar char="●"/>
             </a:pPr>
             <a:r>
-              <a:rPr lang="en"/>
+              <a:rPr lang="en" sz="1500"/>
               <a:t>The increase in revenue will be more than enough to cover the increase in operating costs of the new chair built and allow the company to pursue further ventures with the remaining amount</a:t>
             </a:r>
-            <a:endParaRPr/>
+            <a:endParaRPr sz="1500"/>
           </a:p>
         </p:txBody>
       </p:sp>

</xml_diff>